<commit_message>
Update files to 2 hyperparameters
</commit_message>
<xml_diff>
--- a/ML_Poster_v2.pptx
+++ b/ML_Poster_v2.pptx
@@ -254,7 +254,7 @@
           <a:p>
             <a:fld id="{AFD5325B-1A15-4464-AC58-4D5851FBB6B7}" type="datetimeFigureOut">
               <a:rPr lang="en-CH" smtClean="0"/>
-              <a:t>11/22/2021</a:t>
+              <a:t>11/26/2021</a:t>
             </a:fld>
             <a:endParaRPr lang="en-CH"/>
           </a:p>
@@ -424,7 +424,7 @@
           <a:p>
             <a:fld id="{AFD5325B-1A15-4464-AC58-4D5851FBB6B7}" type="datetimeFigureOut">
               <a:rPr lang="en-CH" smtClean="0"/>
-              <a:t>11/22/2021</a:t>
+              <a:t>11/26/2021</a:t>
             </a:fld>
             <a:endParaRPr lang="en-CH"/>
           </a:p>
@@ -604,7 +604,7 @@
           <a:p>
             <a:fld id="{AFD5325B-1A15-4464-AC58-4D5851FBB6B7}" type="datetimeFigureOut">
               <a:rPr lang="en-CH" smtClean="0"/>
-              <a:t>11/22/2021</a:t>
+              <a:t>11/26/2021</a:t>
             </a:fld>
             <a:endParaRPr lang="en-CH"/>
           </a:p>
@@ -699,7 +699,7 @@
           <a:p>
             <a:fld id="{AFD5325B-1A15-4464-AC58-4D5851FBB6B7}" type="datetimeFigureOut">
               <a:rPr lang="en-CH" smtClean="0"/>
-              <a:t>11/22/2021</a:t>
+              <a:t>11/26/2021</a:t>
             </a:fld>
             <a:endParaRPr lang="en-CH"/>
           </a:p>
@@ -869,7 +869,7 @@
           <a:p>
             <a:fld id="{AFD5325B-1A15-4464-AC58-4D5851FBB6B7}" type="datetimeFigureOut">
               <a:rPr lang="en-CH" smtClean="0"/>
-              <a:t>11/22/2021</a:t>
+              <a:t>11/26/2021</a:t>
             </a:fld>
             <a:endParaRPr lang="en-CH"/>
           </a:p>
@@ -1113,7 +1113,7 @@
           <a:p>
             <a:fld id="{AFD5325B-1A15-4464-AC58-4D5851FBB6B7}" type="datetimeFigureOut">
               <a:rPr lang="en-CH" smtClean="0"/>
-              <a:t>11/22/2021</a:t>
+              <a:t>11/26/2021</a:t>
             </a:fld>
             <a:endParaRPr lang="en-CH"/>
           </a:p>
@@ -1345,7 +1345,7 @@
           <a:p>
             <a:fld id="{AFD5325B-1A15-4464-AC58-4D5851FBB6B7}" type="datetimeFigureOut">
               <a:rPr lang="en-CH" smtClean="0"/>
-              <a:t>11/22/2021</a:t>
+              <a:t>11/26/2021</a:t>
             </a:fld>
             <a:endParaRPr lang="en-CH"/>
           </a:p>
@@ -1712,7 +1712,7 @@
           <a:p>
             <a:fld id="{AFD5325B-1A15-4464-AC58-4D5851FBB6B7}" type="datetimeFigureOut">
               <a:rPr lang="en-CH" smtClean="0"/>
-              <a:t>11/22/2021</a:t>
+              <a:t>11/26/2021</a:t>
             </a:fld>
             <a:endParaRPr lang="en-CH"/>
           </a:p>
@@ -1830,7 +1830,7 @@
           <a:p>
             <a:fld id="{AFD5325B-1A15-4464-AC58-4D5851FBB6B7}" type="datetimeFigureOut">
               <a:rPr lang="en-CH" smtClean="0"/>
-              <a:t>11/22/2021</a:t>
+              <a:t>11/26/2021</a:t>
             </a:fld>
             <a:endParaRPr lang="en-CH"/>
           </a:p>
@@ -1925,7 +1925,7 @@
           <a:p>
             <a:fld id="{AFD5325B-1A15-4464-AC58-4D5851FBB6B7}" type="datetimeFigureOut">
               <a:rPr lang="en-CH" smtClean="0"/>
-              <a:t>11/22/2021</a:t>
+              <a:t>11/26/2021</a:t>
             </a:fld>
             <a:endParaRPr lang="en-CH"/>
           </a:p>
@@ -2202,7 +2202,7 @@
           <a:p>
             <a:fld id="{AFD5325B-1A15-4464-AC58-4D5851FBB6B7}" type="datetimeFigureOut">
               <a:rPr lang="en-CH" smtClean="0"/>
-              <a:t>11/22/2021</a:t>
+              <a:t>11/26/2021</a:t>
             </a:fld>
             <a:endParaRPr lang="en-CH"/>
           </a:p>
@@ -2459,7 +2459,7 @@
           <a:p>
             <a:fld id="{AFD5325B-1A15-4464-AC58-4D5851FBB6B7}" type="datetimeFigureOut">
               <a:rPr lang="en-CH" smtClean="0"/>
-              <a:t>11/22/2021</a:t>
+              <a:t>11/26/2021</a:t>
             </a:fld>
             <a:endParaRPr lang="en-CH"/>
           </a:p>
@@ -2672,7 +2672,7 @@
           <a:p>
             <a:fld id="{AFD5325B-1A15-4464-AC58-4D5851FBB6B7}" type="datetimeFigureOut">
               <a:rPr lang="en-CH" smtClean="0"/>
-              <a:t>11/22/2021</a:t>
+              <a:t>11/26/2021</a:t>
             </a:fld>
             <a:endParaRPr lang="en-CH"/>
           </a:p>
@@ -3078,6 +3078,76 @@
           <a:chExt cx="0" cy="0"/>
         </a:xfrm>
       </p:grpSpPr>
+      <p:pic>
+        <p:nvPicPr>
+          <p:cNvPr id="37" name="Picture 36" descr="Chart, histogram&#10;&#10;Description automatically generated">
+            <a:extLst>
+              <a:ext uri="{FF2B5EF4-FFF2-40B4-BE49-F238E27FC236}">
+                <a16:creationId xmlns:a16="http://schemas.microsoft.com/office/drawing/2014/main" id="{C8D46654-1AE0-4027-996E-C099BE4ED8EF}"/>
+              </a:ext>
+            </a:extLst>
+          </p:cNvPr>
+          <p:cNvPicPr>
+            <a:picLocks noChangeAspect="1"/>
+          </p:cNvPicPr>
+          <p:nvPr/>
+        </p:nvPicPr>
+        <p:blipFill rotWithShape="1">
+          <a:blip r:embed="rId2">
+            <a:extLst>
+              <a:ext uri="{28A0092B-C50C-407E-A947-70E740481C1C}">
+                <a14:useLocalDpi xmlns:a14="http://schemas.microsoft.com/office/drawing/2010/main" val="0"/>
+              </a:ext>
+            </a:extLst>
+          </a:blip>
+          <a:srcRect b="6057"/>
+          <a:stretch/>
+        </p:blipFill>
+        <p:spPr>
+          <a:xfrm>
+            <a:off x="10557205" y="6514813"/>
+            <a:ext cx="6170295" cy="1932175"/>
+          </a:xfrm>
+          <a:prstGeom prst="rect">
+            <a:avLst/>
+          </a:prstGeom>
+        </p:spPr>
+      </p:pic>
+      <p:pic>
+        <p:nvPicPr>
+          <p:cNvPr id="16" name="Picture 15" descr="Chart&#10;&#10;Description automatically generated">
+            <a:extLst>
+              <a:ext uri="{FF2B5EF4-FFF2-40B4-BE49-F238E27FC236}">
+                <a16:creationId xmlns:a16="http://schemas.microsoft.com/office/drawing/2014/main" id="{108E50C5-21A4-4CA1-82ED-12802D98FA18}"/>
+              </a:ext>
+            </a:extLst>
+          </p:cNvPr>
+          <p:cNvPicPr>
+            <a:picLocks noChangeAspect="1"/>
+          </p:cNvPicPr>
+          <p:nvPr/>
+        </p:nvPicPr>
+        <p:blipFill rotWithShape="1">
+          <a:blip r:embed="rId3">
+            <a:extLst>
+              <a:ext uri="{28A0092B-C50C-407E-A947-70E740481C1C}">
+                <a14:useLocalDpi xmlns:a14="http://schemas.microsoft.com/office/drawing/2010/main" val="0"/>
+              </a:ext>
+            </a:extLst>
+          </a:blip>
+          <a:srcRect l="2101" t="11135" r="5228" b="7908"/>
+          <a:stretch/>
+        </p:blipFill>
+        <p:spPr>
+          <a:xfrm>
+            <a:off x="15968423" y="2507967"/>
+            <a:ext cx="5102477" cy="4012017"/>
+          </a:xfrm>
+          <a:prstGeom prst="rect">
+            <a:avLst/>
+          </a:prstGeom>
+        </p:spPr>
+      </p:pic>
       <p:sp>
         <p:nvSpPr>
           <p:cNvPr id="4" name="Rectangle 3">
@@ -3092,12 +3162,13 @@
         </p:nvSpPr>
         <p:spPr>
           <a:xfrm>
-            <a:off x="171450" y="2342867"/>
+            <a:off x="171450" y="2507967"/>
             <a:ext cx="21004894" cy="6248969"/>
           </a:xfrm>
           <a:prstGeom prst="rect">
             <a:avLst/>
           </a:prstGeom>
+          <a:noFill/>
           <a:ln w="38100"/>
         </p:spPr>
         <p:style>
@@ -3130,7 +3201,7 @@
             </a:pPr>
             <a:r>
               <a:rPr lang="en-US" sz="1600" dirty="0"/>
-              <a:t>The medical data set on cerebral strokes is supplement to Lui, Fan and Wu (2019) was published on data.mendeley.com [2]. </a:t>
+              <a:t>The medical data set on cerebral strokes is supplement to Lui, Fan and Wu (2019) was published on data.mendeley.com [2] and contains 43’000 observations of potential patients.</a:t>
             </a:r>
           </a:p>
           <a:p>
@@ -3140,14 +3211,15 @@
             </a:pPr>
             <a:r>
               <a:rPr lang="en-US" sz="1600" dirty="0"/>
-              <a:t>It contains 43’000 observations of potential patients, one binary target variable indicating whether a patient has suffered</a:t>
-            </a:r>
-            <a:br>
+              <a:t>It includes one binary target variable indicating whether a patient had a stroke and 11 features on the </a:t>
+            </a:r>
+            <a:r>
+              <a:rPr lang="en-US" dirty="0"/>
+              <a:t>patient's</a:t>
+            </a:r>
+            <a:r>
               <a:rPr lang="en-US" sz="1600" dirty="0"/>
-            </a:br>
-            <a:r>
-              <a:rPr lang="en-US" sz="1600" dirty="0"/>
-              <a:t>a stroke and 11 features on the patients’ </a:t>
+              <a:t> </a:t>
             </a:r>
             <a:r>
               <a:rPr lang="en-GB" sz="1600" b="0" i="0" dirty="0">
@@ -3194,7 +3266,22 @@
                 </a:solidFill>
                 <a:latin typeface="NexusSerif"/>
               </a:rPr>
-              <a:t>The data is characterized by class imbalance in the target variable, with only 738 records of cerebral stroke (figure 1), </a:t>
+              <a:t>The data is characterized by class imbalance in the target variable, with only 738 records of cerebral stroke (figure 1), and missing values primarily in the ‘Smoking Status’ feature (figure XX).</a:t>
+            </a:r>
+          </a:p>
+          <a:p>
+            <a:pPr marL="342900" indent="-342900">
+              <a:buFont typeface="Arial" panose="020B0604020202020204" pitchFamily="34" charset="0"/>
+              <a:buChar char="•"/>
+            </a:pPr>
+            <a:r>
+              <a:rPr lang="en-GB" sz="1600" dirty="0">
+                <a:solidFill>
+                  <a:srgbClr val="2E2E2E"/>
+                </a:solidFill>
+                <a:latin typeface="NexusSerif"/>
+              </a:rPr>
+              <a:t>Missing Values: 1457 observations with missing ‘BMI’ values were discarded, they only amount to 3.3% of the data set. The 30.6% of missing records of ‘Smoking Status’ are treated as a</a:t>
             </a:r>
             <a:br>
               <a:rPr lang="en-GB" sz="1600" dirty="0">
@@ -3211,22 +3298,7 @@
                 </a:solidFill>
                 <a:latin typeface="NexusSerif"/>
               </a:rPr>
-              <a:t>and missing values primarily in the ‘Smoking Status’ feature (figure XX).</a:t>
-            </a:r>
-          </a:p>
-          <a:p>
-            <a:pPr marL="342900" indent="-342900">
-              <a:buFont typeface="Arial" panose="020B0604020202020204" pitchFamily="34" charset="0"/>
-              <a:buChar char="•"/>
-            </a:pPr>
-            <a:r>
-              <a:rPr lang="en-GB" sz="1600" dirty="0">
-                <a:solidFill>
-                  <a:srgbClr val="2E2E2E"/>
-                </a:solidFill>
-                <a:latin typeface="NexusSerif"/>
-              </a:rPr>
-              <a:t>Missing Values: 1457 observations with missing ‘BMI’ values were discarded, they only amount to 3.3% of the data set.</a:t>
+              <a:t>distinct ‘Unknown’ category. This is done because I suspect the variable to be not completely missing at random, e.g., because patients might not want to disclose that they are a smoker. </a:t>
             </a:r>
             <a:br>
               <a:rPr lang="en-GB" sz="1600" dirty="0">
@@ -3243,73 +3315,22 @@
                 </a:solidFill>
                 <a:latin typeface="NexusSerif"/>
               </a:rPr>
-              <a:t>The 30.6% of missing records of ‘Smoking Status’ are treated as a distinct ‘Unknown’ category. This is done because</a:t>
-            </a:r>
-            <a:br>
+              <a:t>In this case, an unknown category allows the model to capture this information, compared to imputing by the majority category or discarding the column all together.</a:t>
+            </a:r>
+          </a:p>
+          <a:p>
+            <a:pPr marL="342900" indent="-342900">
+              <a:buFont typeface="Arial" panose="020B0604020202020204" pitchFamily="34" charset="0"/>
+              <a:buChar char="•"/>
+            </a:pPr>
+            <a:r>
               <a:rPr lang="en-GB" sz="1600" dirty="0">
                 <a:solidFill>
                   <a:srgbClr val="2E2E2E"/>
                 </a:solidFill>
                 <a:latin typeface="NexusSerif"/>
               </a:rPr>
-            </a:br>
-            <a:r>
-              <a:rPr lang="en-GB" sz="1600" dirty="0">
-                <a:solidFill>
-                  <a:srgbClr val="2E2E2E"/>
-                </a:solidFill>
-                <a:latin typeface="NexusSerif"/>
-              </a:rPr>
-              <a:t>I suspect the variable to be not completely missing at random, e.g., because patients might not want to disclose that they</a:t>
-            </a:r>
-            <a:br>
-              <a:rPr lang="en-GB" sz="1600" dirty="0">
-                <a:solidFill>
-                  <a:srgbClr val="2E2E2E"/>
-                </a:solidFill>
-                <a:latin typeface="NexusSerif"/>
-              </a:rPr>
-            </a:br>
-            <a:r>
-              <a:rPr lang="en-GB" sz="1600" dirty="0">
-                <a:solidFill>
-                  <a:srgbClr val="2E2E2E"/>
-                </a:solidFill>
-                <a:latin typeface="NexusSerif"/>
-              </a:rPr>
-              <a:t>are a smoker. In this case, an unknown category allows the model to capture this information, compared to imputing by</a:t>
-            </a:r>
-            <a:br>
-              <a:rPr lang="en-GB" sz="1600" dirty="0">
-                <a:solidFill>
-                  <a:srgbClr val="2E2E2E"/>
-                </a:solidFill>
-                <a:latin typeface="NexusSerif"/>
-              </a:rPr>
-            </a:br>
-            <a:r>
-              <a:rPr lang="en-GB" sz="1600" dirty="0">
-                <a:solidFill>
-                  <a:srgbClr val="2E2E2E"/>
-                </a:solidFill>
-                <a:latin typeface="NexusSerif"/>
-              </a:rPr>
-              <a:t>the majority category or discarding the column all together.</a:t>
-            </a:r>
-          </a:p>
-          <a:p>
-            <a:pPr marL="342900" indent="-342900">
-              <a:buFont typeface="Arial" panose="020B0604020202020204" pitchFamily="34" charset="0"/>
-              <a:buChar char="•"/>
-            </a:pPr>
-            <a:r>
-              <a:rPr lang="en-GB" sz="1600" dirty="0">
-                <a:solidFill>
-                  <a:srgbClr val="2E2E2E"/>
-                </a:solidFill>
-                <a:latin typeface="NexusSerif"/>
-              </a:rPr>
-              <a:t>Standardization: The data is not standardized at this step, because the </a:t>
+              <a:t>Standardization: The data is not standardized, because it is not required for the DT model </a:t>
             </a:r>
             <a:r>
               <a:rPr lang="en-US" sz="1600" dirty="0">
@@ -3318,24 +3339,22 @@
                 </a:solidFill>
                 <a:latin typeface="NexusSerif"/>
               </a:rPr>
-              <a:t>prediction accuracy of Decision Tree models is </a:t>
-            </a:r>
-            <a:br>
+              <a:t>and because MATLAB’s KNN implementation, has built-in standardization.</a:t>
+            </a:r>
+          </a:p>
+          <a:p>
+            <a:pPr marL="342900" indent="-342900">
+              <a:buFont typeface="Arial" panose="020B0604020202020204" pitchFamily="34" charset="0"/>
+              <a:buChar char="•"/>
+            </a:pPr>
+            <a:r>
               <a:rPr lang="en-US" sz="1600" dirty="0">
                 <a:solidFill>
                   <a:srgbClr val="2E2E2E"/>
                 </a:solidFill>
                 <a:latin typeface="NexusSerif"/>
               </a:rPr>
-            </a:br>
-            <a:r>
-              <a:rPr lang="en-US" sz="1600" dirty="0">
-                <a:solidFill>
-                  <a:srgbClr val="2E2E2E"/>
-                </a:solidFill>
-                <a:latin typeface="NexusSerif"/>
-              </a:rPr>
-              <a:t>invariant under strictly monotone transformations and MATLAB’s KNN implementation, has a built-in standardization.</a:t>
+              <a:t>The classic summary statistics table is omitted because the figures (XXX-XXX) provide deeper insight into the nature of the variables, especially for the many binary variables</a:t>
             </a:r>
           </a:p>
           <a:p>
@@ -3441,7 +3460,7 @@
         <p:spPr>
           <a:xfrm>
             <a:off x="171450" y="1134719"/>
-            <a:ext cx="21004894" cy="1208431"/>
+            <a:ext cx="21004894" cy="1366117"/>
           </a:xfrm>
           <a:prstGeom prst="rect">
             <a:avLst/>
@@ -3474,842 +3493,12 @@
           <a:p>
             <a:r>
               <a:rPr lang="en-US" sz="1600" dirty="0"/>
-              <a:t>In 2020, England recorded cerebrovascular diseases are the fourth leading cause of death [1]. A cerebral stroke is a subtype of these diseases in which the blood supply to part of the brain is interrupted, depriving brain tissue of oxygen and nutrients and causing the death of brain cells within minutes. Therefore, predicting whether a person will have a cerebral stroke can be of great importance to public health, as it can help ensure adequate preparation and quick action in an emergency. The goal of this project is to train and compare the ability of a Decision Tree (DT) and a K-Nearest Neighbor (KNN) classifier to predict whether a person will suffer a stroke.</a:t>
+              <a:t>In 2020, England recorded cerebrovascular diseases are the fourth leading cause of death [1]. A cerebral stroke is a subtype of these diseases in which the blood supply to part of the brain is interrupted, depriving brain tissue of oxygen and nutrients and causing the death of brain cells within minutes. Therefore, predicting whether a person will have a cerebral stroke can be of great importance to public health, as it can help ensure adequate preparation and quick action in an emergency. The goal of this project is to train and compare the ability of a Decision Tree (DT) and a K-Nearest Neighbor (KNN) classifier to predict whether a person will suffer a stroke. This extends the work of Lui, Fan, and Wu (2019) because it explores the potential of two models that were not analyzed in the original work, and because the models are more interpretable and intuitive, which is an important property for medical applications.</a:t>
             </a:r>
             <a:endParaRPr lang="en-CH" sz="1600" dirty="0"/>
           </a:p>
         </p:txBody>
       </p:sp>
-      <p:pic>
-        <p:nvPicPr>
-          <p:cNvPr id="16" name="Picture 15" descr="Chart&#10;&#10;Description automatically generated">
-            <a:extLst>
-              <a:ext uri="{FF2B5EF4-FFF2-40B4-BE49-F238E27FC236}">
-                <a16:creationId xmlns:a16="http://schemas.microsoft.com/office/drawing/2014/main" id="{108E50C5-21A4-4CA1-82ED-12802D98FA18}"/>
-              </a:ext>
-            </a:extLst>
-          </p:cNvPr>
-          <p:cNvPicPr>
-            <a:picLocks noChangeAspect="1"/>
-          </p:cNvPicPr>
-          <p:nvPr/>
-        </p:nvPicPr>
-        <p:blipFill rotWithShape="1">
-          <a:blip r:embed="rId2">
-            <a:extLst>
-              <a:ext uri="{28A0092B-C50C-407E-A947-70E740481C1C}">
-                <a14:useLocalDpi xmlns:a14="http://schemas.microsoft.com/office/drawing/2010/main" val="0"/>
-              </a:ext>
-            </a:extLst>
-          </a:blip>
-          <a:srcRect l="2101" t="11135" r="5228" b="7908"/>
-          <a:stretch/>
-        </p:blipFill>
-        <p:spPr>
-          <a:xfrm>
-            <a:off x="15114488" y="2373709"/>
-            <a:ext cx="6038632" cy="4321628"/>
-          </a:xfrm>
-          <a:prstGeom prst="rect">
-            <a:avLst/>
-          </a:prstGeom>
-        </p:spPr>
-      </p:pic>
-      <p:graphicFrame>
-        <p:nvGraphicFramePr>
-          <p:cNvPr id="27" name="Table 27">
-            <a:extLst>
-              <a:ext uri="{FF2B5EF4-FFF2-40B4-BE49-F238E27FC236}">
-                <a16:creationId xmlns:a16="http://schemas.microsoft.com/office/drawing/2014/main" id="{EE35C4B2-E62D-4C0F-A41F-358DF773639B}"/>
-              </a:ext>
-            </a:extLst>
-          </p:cNvPr>
-          <p:cNvGraphicFramePr>
-            <a:graphicFrameLocks noGrp="1"/>
-          </p:cNvGraphicFramePr>
-          <p:nvPr>
-            <p:extLst>
-              <p:ext uri="{D42A27DB-BD31-4B8C-83A1-F6EECF244321}">
-                <p14:modId xmlns:p14="http://schemas.microsoft.com/office/powerpoint/2010/main" val="1595022317"/>
-              </p:ext>
-            </p:extLst>
-          </p:nvPr>
-        </p:nvGraphicFramePr>
-        <p:xfrm>
-          <a:off x="11325124" y="2724248"/>
-          <a:ext cx="3281364" cy="2590800"/>
-        </p:xfrm>
-        <a:graphic>
-          <a:graphicData uri="http://schemas.openxmlformats.org/drawingml/2006/table">
-            <a:tbl>
-              <a:tblPr firstRow="1" bandRow="1">
-                <a:tableStyleId>{9D7B26C5-4107-4FEC-AEDC-1716B250A1EF}</a:tableStyleId>
-              </a:tblPr>
-              <a:tblGrid>
-                <a:gridCol w="997268">
-                  <a:extLst>
-                    <a:ext uri="{9D8B030D-6E8A-4147-A177-3AD203B41FA5}">
-                      <a16:colId xmlns:a16="http://schemas.microsoft.com/office/drawing/2014/main" val="3467800109"/>
-                    </a:ext>
-                  </a:extLst>
-                </a:gridCol>
-                <a:gridCol w="535305">
-                  <a:extLst>
-                    <a:ext uri="{9D8B030D-6E8A-4147-A177-3AD203B41FA5}">
-                      <a16:colId xmlns:a16="http://schemas.microsoft.com/office/drawing/2014/main" val="2542221043"/>
-                    </a:ext>
-                  </a:extLst>
-                </a:gridCol>
-                <a:gridCol w="606743">
-                  <a:extLst>
-                    <a:ext uri="{9D8B030D-6E8A-4147-A177-3AD203B41FA5}">
-                      <a16:colId xmlns:a16="http://schemas.microsoft.com/office/drawing/2014/main" val="2395979764"/>
-                    </a:ext>
-                  </a:extLst>
-                </a:gridCol>
-                <a:gridCol w="606743">
-                  <a:extLst>
-                    <a:ext uri="{9D8B030D-6E8A-4147-A177-3AD203B41FA5}">
-                      <a16:colId xmlns:a16="http://schemas.microsoft.com/office/drawing/2014/main" val="1101614973"/>
-                    </a:ext>
-                  </a:extLst>
-                </a:gridCol>
-                <a:gridCol w="535305">
-                  <a:extLst>
-                    <a:ext uri="{9D8B030D-6E8A-4147-A177-3AD203B41FA5}">
-                      <a16:colId xmlns:a16="http://schemas.microsoft.com/office/drawing/2014/main" val="2784924489"/>
-                    </a:ext>
-                  </a:extLst>
-                </a:gridCol>
-              </a:tblGrid>
-              <a:tr h="178772">
-                <a:tc>
-                  <a:txBody>
-                    <a:bodyPr/>
-                    <a:lstStyle/>
-                    <a:p>
-                      <a:r>
-                        <a:rPr lang="en-GB" sz="1100" dirty="0"/>
-                        <a:t>Variable</a:t>
-                      </a:r>
-                    </a:p>
-                  </a:txBody>
-                  <a:tcPr/>
-                </a:tc>
-                <a:tc>
-                  <a:txBody>
-                    <a:bodyPr/>
-                    <a:lstStyle/>
-                    <a:p>
-                      <a:r>
-                        <a:rPr lang="en-GB" sz="1100" dirty="0"/>
-                        <a:t>Min</a:t>
-                      </a:r>
-                    </a:p>
-                  </a:txBody>
-                  <a:tcPr/>
-                </a:tc>
-                <a:tc>
-                  <a:txBody>
-                    <a:bodyPr/>
-                    <a:lstStyle/>
-                    <a:p>
-                      <a:r>
-                        <a:rPr lang="en-GB" sz="1100" dirty="0"/>
-                        <a:t>Mean</a:t>
-                      </a:r>
-                    </a:p>
-                  </a:txBody>
-                  <a:tcPr/>
-                </a:tc>
-                <a:tc>
-                  <a:txBody>
-                    <a:bodyPr/>
-                    <a:lstStyle/>
-                    <a:p>
-                      <a:r>
-                        <a:rPr lang="en-GB" sz="1100" dirty="0"/>
-                        <a:t>Max</a:t>
-                      </a:r>
-                    </a:p>
-                  </a:txBody>
-                  <a:tcPr/>
-                </a:tc>
-                <a:tc>
-                  <a:txBody>
-                    <a:bodyPr/>
-                    <a:lstStyle/>
-                    <a:p>
-                      <a:r>
-                        <a:rPr lang="en-GB" sz="1100" dirty="0"/>
-                        <a:t>SD</a:t>
-                      </a:r>
-                    </a:p>
-                  </a:txBody>
-                  <a:tcPr/>
-                </a:tc>
-                <a:extLst>
-                  <a:ext uri="{0D108BD9-81ED-4DB2-BD59-A6C34878D82A}">
-                    <a16:rowId xmlns:a16="http://schemas.microsoft.com/office/drawing/2014/main" val="1769268115"/>
-                  </a:ext>
-                </a:extLst>
-              </a:tr>
-              <a:tr h="200633">
-                <a:tc>
-                  <a:txBody>
-                    <a:bodyPr/>
-                    <a:lstStyle/>
-                    <a:p>
-                      <a:r>
-                        <a:rPr lang="en-GB" sz="1100" dirty="0"/>
-                        <a:t>Stroke</a:t>
-                      </a:r>
-                    </a:p>
-                  </a:txBody>
-                  <a:tcPr/>
-                </a:tc>
-                <a:tc>
-                  <a:txBody>
-                    <a:bodyPr/>
-                    <a:lstStyle/>
-                    <a:p>
-                      <a:r>
-                        <a:rPr lang="en-GB" sz="1100" dirty="0"/>
-                        <a:t>0</a:t>
-                      </a:r>
-                    </a:p>
-                  </a:txBody>
-                  <a:tcPr/>
-                </a:tc>
-                <a:tc>
-                  <a:txBody>
-                    <a:bodyPr/>
-                    <a:lstStyle/>
-                    <a:p>
-                      <a:r>
-                        <a:rPr lang="en-GB" sz="1100" dirty="0"/>
-                        <a:t>0.02</a:t>
-                      </a:r>
-                    </a:p>
-                  </a:txBody>
-                  <a:tcPr/>
-                </a:tc>
-                <a:tc>
-                  <a:txBody>
-                    <a:bodyPr/>
-                    <a:lstStyle/>
-                    <a:p>
-                      <a:r>
-                        <a:rPr lang="en-GB" sz="1100" dirty="0"/>
-                        <a:t>1</a:t>
-                      </a:r>
-                    </a:p>
-                  </a:txBody>
-                  <a:tcPr/>
-                </a:tc>
-                <a:tc>
-                  <a:txBody>
-                    <a:bodyPr/>
-                    <a:lstStyle/>
-                    <a:p>
-                      <a:r>
-                        <a:rPr lang="en-GB" sz="1100" dirty="0"/>
-                        <a:t>0.12</a:t>
-                      </a:r>
-                    </a:p>
-                  </a:txBody>
-                  <a:tcPr/>
-                </a:tc>
-                <a:extLst>
-                  <a:ext uri="{0D108BD9-81ED-4DB2-BD59-A6C34878D82A}">
-                    <a16:rowId xmlns:a16="http://schemas.microsoft.com/office/drawing/2014/main" val="1205327121"/>
-                  </a:ext>
-                </a:extLst>
-              </a:tr>
-              <a:tr h="200633">
-                <a:tc>
-                  <a:txBody>
-                    <a:bodyPr/>
-                    <a:lstStyle/>
-                    <a:p>
-                      <a:r>
-                        <a:rPr lang="en-GB" sz="1100" dirty="0"/>
-                        <a:t>Gender</a:t>
-                      </a:r>
-                    </a:p>
-                  </a:txBody>
-                  <a:tcPr/>
-                </a:tc>
-                <a:tc>
-                  <a:txBody>
-                    <a:bodyPr/>
-                    <a:lstStyle/>
-                    <a:p>
-                      <a:r>
-                        <a:rPr lang="en-GB" sz="1100" dirty="0"/>
-                        <a:t>0</a:t>
-                      </a:r>
-                    </a:p>
-                  </a:txBody>
-                  <a:tcPr/>
-                </a:tc>
-                <a:tc>
-                  <a:txBody>
-                    <a:bodyPr/>
-                    <a:lstStyle/>
-                    <a:p>
-                      <a:r>
-                        <a:rPr lang="en-GB" sz="1100" dirty="0"/>
-                        <a:t>0.40</a:t>
-                      </a:r>
-                    </a:p>
-                  </a:txBody>
-                  <a:tcPr/>
-                </a:tc>
-                <a:tc>
-                  <a:txBody>
-                    <a:bodyPr/>
-                    <a:lstStyle/>
-                    <a:p>
-                      <a:r>
-                        <a:rPr lang="en-GB" sz="1100" dirty="0"/>
-                        <a:t>1</a:t>
-                      </a:r>
-                    </a:p>
-                  </a:txBody>
-                  <a:tcPr/>
-                </a:tc>
-                <a:tc>
-                  <a:txBody>
-                    <a:bodyPr/>
-                    <a:lstStyle/>
-                    <a:p>
-                      <a:r>
-                        <a:rPr lang="en-GB" sz="1100" dirty="0"/>
-                        <a:t>0.49</a:t>
-                      </a:r>
-                    </a:p>
-                  </a:txBody>
-                  <a:tcPr/>
-                </a:tc>
-                <a:extLst>
-                  <a:ext uri="{0D108BD9-81ED-4DB2-BD59-A6C34878D82A}">
-                    <a16:rowId xmlns:a16="http://schemas.microsoft.com/office/drawing/2014/main" val="333028761"/>
-                  </a:ext>
-                </a:extLst>
-              </a:tr>
-              <a:tr h="200633">
-                <a:tc>
-                  <a:txBody>
-                    <a:bodyPr/>
-                    <a:lstStyle/>
-                    <a:p>
-                      <a:r>
-                        <a:rPr lang="en-GB" sz="1100" dirty="0"/>
-                        <a:t>Hypertension</a:t>
-                      </a:r>
-                    </a:p>
-                  </a:txBody>
-                  <a:tcPr/>
-                </a:tc>
-                <a:tc>
-                  <a:txBody>
-                    <a:bodyPr/>
-                    <a:lstStyle/>
-                    <a:p>
-                      <a:r>
-                        <a:rPr lang="en-GB" sz="1100" dirty="0"/>
-                        <a:t>0</a:t>
-                      </a:r>
-                    </a:p>
-                  </a:txBody>
-                  <a:tcPr/>
-                </a:tc>
-                <a:tc>
-                  <a:txBody>
-                    <a:bodyPr/>
-                    <a:lstStyle/>
-                    <a:p>
-                      <a:r>
-                        <a:rPr lang="en-GB" sz="1100" dirty="0"/>
-                        <a:t>0.09</a:t>
-                      </a:r>
-                    </a:p>
-                  </a:txBody>
-                  <a:tcPr/>
-                </a:tc>
-                <a:tc>
-                  <a:txBody>
-                    <a:bodyPr/>
-                    <a:lstStyle/>
-                    <a:p>
-                      <a:r>
-                        <a:rPr lang="en-GB" sz="1100" dirty="0"/>
-                        <a:t>1</a:t>
-                      </a:r>
-                    </a:p>
-                  </a:txBody>
-                  <a:tcPr/>
-                </a:tc>
-                <a:tc>
-                  <a:txBody>
-                    <a:bodyPr/>
-                    <a:lstStyle/>
-                    <a:p>
-                      <a:r>
-                        <a:rPr lang="en-GB" sz="1100" dirty="0"/>
-                        <a:t>0.28</a:t>
-                      </a:r>
-                    </a:p>
-                  </a:txBody>
-                  <a:tcPr/>
-                </a:tc>
-                <a:extLst>
-                  <a:ext uri="{0D108BD9-81ED-4DB2-BD59-A6C34878D82A}">
-                    <a16:rowId xmlns:a16="http://schemas.microsoft.com/office/drawing/2014/main" val="2712605215"/>
-                  </a:ext>
-                </a:extLst>
-              </a:tr>
-              <a:tr h="200633">
-                <a:tc>
-                  <a:txBody>
-                    <a:bodyPr/>
-                    <a:lstStyle/>
-                    <a:p>
-                      <a:r>
-                        <a:rPr lang="en-GB" sz="1100" dirty="0"/>
-                        <a:t>Heart Disease</a:t>
-                      </a:r>
-                    </a:p>
-                  </a:txBody>
-                  <a:tcPr/>
-                </a:tc>
-                <a:tc>
-                  <a:txBody>
-                    <a:bodyPr/>
-                    <a:lstStyle/>
-                    <a:p>
-                      <a:r>
-                        <a:rPr lang="en-GB" sz="1100" dirty="0"/>
-                        <a:t>0</a:t>
-                      </a:r>
-                    </a:p>
-                  </a:txBody>
-                  <a:tcPr/>
-                </a:tc>
-                <a:tc>
-                  <a:txBody>
-                    <a:bodyPr/>
-                    <a:lstStyle/>
-                    <a:p>
-                      <a:r>
-                        <a:rPr lang="en-GB" sz="1100" dirty="0"/>
-                        <a:t>0.04</a:t>
-                      </a:r>
-                    </a:p>
-                  </a:txBody>
-                  <a:tcPr/>
-                </a:tc>
-                <a:tc>
-                  <a:txBody>
-                    <a:bodyPr/>
-                    <a:lstStyle/>
-                    <a:p>
-                      <a:r>
-                        <a:rPr lang="en-GB" sz="1100" dirty="0"/>
-                        <a:t>1</a:t>
-                      </a:r>
-                    </a:p>
-                  </a:txBody>
-                  <a:tcPr/>
-                </a:tc>
-                <a:tc>
-                  <a:txBody>
-                    <a:bodyPr/>
-                    <a:lstStyle/>
-                    <a:p>
-                      <a:r>
-                        <a:rPr lang="en-GB" sz="1100" dirty="0"/>
-                        <a:t>0.20</a:t>
-                      </a:r>
-                    </a:p>
-                  </a:txBody>
-                  <a:tcPr/>
-                </a:tc>
-                <a:extLst>
-                  <a:ext uri="{0D108BD9-81ED-4DB2-BD59-A6C34878D82A}">
-                    <a16:rowId xmlns:a16="http://schemas.microsoft.com/office/drawing/2014/main" val="2833281321"/>
-                  </a:ext>
-                </a:extLst>
-              </a:tr>
-              <a:tr h="200633">
-                <a:tc>
-                  <a:txBody>
-                    <a:bodyPr/>
-                    <a:lstStyle/>
-                    <a:p>
-                      <a:r>
-                        <a:rPr lang="en-GB" sz="1100" dirty="0"/>
-                        <a:t>Ever Married</a:t>
-                      </a:r>
-                    </a:p>
-                  </a:txBody>
-                  <a:tcPr/>
-                </a:tc>
-                <a:tc>
-                  <a:txBody>
-                    <a:bodyPr/>
-                    <a:lstStyle/>
-                    <a:p>
-                      <a:r>
-                        <a:rPr lang="en-GB" sz="1100" dirty="0"/>
-                        <a:t>0</a:t>
-                      </a:r>
-                    </a:p>
-                  </a:txBody>
-                  <a:tcPr/>
-                </a:tc>
-                <a:tc>
-                  <a:txBody>
-                    <a:bodyPr/>
-                    <a:lstStyle/>
-                    <a:p>
-                      <a:r>
-                        <a:rPr lang="en-GB" sz="1100" dirty="0"/>
-                        <a:t>0.64</a:t>
-                      </a:r>
-                    </a:p>
-                  </a:txBody>
-                  <a:tcPr/>
-                </a:tc>
-                <a:tc>
-                  <a:txBody>
-                    <a:bodyPr/>
-                    <a:lstStyle/>
-                    <a:p>
-                      <a:r>
-                        <a:rPr lang="en-GB" sz="1100" dirty="0"/>
-                        <a:t>1</a:t>
-                      </a:r>
-                    </a:p>
-                  </a:txBody>
-                  <a:tcPr/>
-                </a:tc>
-                <a:tc>
-                  <a:txBody>
-                    <a:bodyPr/>
-                    <a:lstStyle/>
-                    <a:p>
-                      <a:r>
-                        <a:rPr lang="en-GB" sz="1100" dirty="0"/>
-                        <a:t>0.48</a:t>
-                      </a:r>
-                    </a:p>
-                  </a:txBody>
-                  <a:tcPr/>
-                </a:tc>
-                <a:extLst>
-                  <a:ext uri="{0D108BD9-81ED-4DB2-BD59-A6C34878D82A}">
-                    <a16:rowId xmlns:a16="http://schemas.microsoft.com/office/drawing/2014/main" val="1832187765"/>
-                  </a:ext>
-                </a:extLst>
-              </a:tr>
-              <a:tr h="200633">
-                <a:tc>
-                  <a:txBody>
-                    <a:bodyPr/>
-                    <a:lstStyle/>
-                    <a:p>
-                      <a:r>
-                        <a:rPr lang="en-GB" sz="1100" dirty="0"/>
-                        <a:t>Urban Home</a:t>
-                      </a:r>
-                    </a:p>
-                  </a:txBody>
-                  <a:tcPr/>
-                </a:tc>
-                <a:tc>
-                  <a:txBody>
-                    <a:bodyPr/>
-                    <a:lstStyle/>
-                    <a:p>
-                      <a:r>
-                        <a:rPr lang="en-GB" sz="1100" dirty="0"/>
-                        <a:t>0</a:t>
-                      </a:r>
-                    </a:p>
-                  </a:txBody>
-                  <a:tcPr/>
-                </a:tc>
-                <a:tc>
-                  <a:txBody>
-                    <a:bodyPr/>
-                    <a:lstStyle/>
-                    <a:p>
-                      <a:r>
-                        <a:rPr lang="en-GB" sz="1100" dirty="0"/>
-                        <a:t>0.50</a:t>
-                      </a:r>
-                    </a:p>
-                  </a:txBody>
-                  <a:tcPr/>
-                </a:tc>
-                <a:tc>
-                  <a:txBody>
-                    <a:bodyPr/>
-                    <a:lstStyle/>
-                    <a:p>
-                      <a:r>
-                        <a:rPr lang="en-GB" sz="1100" dirty="0"/>
-                        <a:t>1</a:t>
-                      </a:r>
-                    </a:p>
-                  </a:txBody>
-                  <a:tcPr/>
-                </a:tc>
-                <a:tc>
-                  <a:txBody>
-                    <a:bodyPr/>
-                    <a:lstStyle/>
-                    <a:p>
-                      <a:r>
-                        <a:rPr lang="en-GB" sz="1100" dirty="0"/>
-                        <a:t>0.50</a:t>
-                      </a:r>
-                    </a:p>
-                  </a:txBody>
-                  <a:tcPr/>
-                </a:tc>
-                <a:extLst>
-                  <a:ext uri="{0D108BD9-81ED-4DB2-BD59-A6C34878D82A}">
-                    <a16:rowId xmlns:a16="http://schemas.microsoft.com/office/drawing/2014/main" val="3461106054"/>
-                  </a:ext>
-                </a:extLst>
-              </a:tr>
-              <a:tr h="200633">
-                <a:tc>
-                  <a:txBody>
-                    <a:bodyPr/>
-                    <a:lstStyle/>
-                    <a:p>
-                      <a:r>
-                        <a:rPr lang="en-GB" sz="1100" dirty="0"/>
-                        <a:t>Age</a:t>
-                      </a:r>
-                    </a:p>
-                  </a:txBody>
-                  <a:tcPr/>
-                </a:tc>
-                <a:tc>
-                  <a:txBody>
-                    <a:bodyPr/>
-                    <a:lstStyle/>
-                    <a:p>
-                      <a:r>
-                        <a:rPr lang="en-GB" sz="1100" dirty="0"/>
-                        <a:t>0</a:t>
-                      </a:r>
-                    </a:p>
-                  </a:txBody>
-                  <a:tcPr/>
-                </a:tc>
-                <a:tc>
-                  <a:txBody>
-                    <a:bodyPr/>
-                    <a:lstStyle/>
-                    <a:p>
-                      <a:r>
-                        <a:rPr lang="en-GB" sz="1100" dirty="0"/>
-                        <a:t>41</a:t>
-                      </a:r>
-                    </a:p>
-                  </a:txBody>
-                  <a:tcPr/>
-                </a:tc>
-                <a:tc>
-                  <a:txBody>
-                    <a:bodyPr/>
-                    <a:lstStyle/>
-                    <a:p>
-                      <a:r>
-                        <a:rPr lang="en-GB" sz="1100" dirty="0"/>
-                        <a:t>82</a:t>
-                      </a:r>
-                    </a:p>
-                  </a:txBody>
-                  <a:tcPr/>
-                </a:tc>
-                <a:tc>
-                  <a:txBody>
-                    <a:bodyPr/>
-                    <a:lstStyle/>
-                    <a:p>
-                      <a:r>
-                        <a:rPr lang="en-GB" sz="1100" dirty="0"/>
-                        <a:t>22.48</a:t>
-                      </a:r>
-                    </a:p>
-                  </a:txBody>
-                  <a:tcPr/>
-                </a:tc>
-                <a:extLst>
-                  <a:ext uri="{0D108BD9-81ED-4DB2-BD59-A6C34878D82A}">
-                    <a16:rowId xmlns:a16="http://schemas.microsoft.com/office/drawing/2014/main" val="1846404377"/>
-                  </a:ext>
-                </a:extLst>
-              </a:tr>
-              <a:tr h="200633">
-                <a:tc>
-                  <a:txBody>
-                    <a:bodyPr/>
-                    <a:lstStyle/>
-                    <a:p>
-                      <a:r>
-                        <a:rPr lang="en-GB" sz="1100" dirty="0" err="1"/>
-                        <a:t>Avg</a:t>
-                      </a:r>
-                      <a:r>
-                        <a:rPr lang="en-GB" sz="1100" dirty="0"/>
-                        <a:t> Glucose</a:t>
-                      </a:r>
-                    </a:p>
-                  </a:txBody>
-                  <a:tcPr/>
-                </a:tc>
-                <a:tc>
-                  <a:txBody>
-                    <a:bodyPr/>
-                    <a:lstStyle/>
-                    <a:p>
-                      <a:r>
-                        <a:rPr lang="en-GB" sz="1100" dirty="0"/>
-                        <a:t>55.00</a:t>
-                      </a:r>
-                    </a:p>
-                  </a:txBody>
-                  <a:tcPr/>
-                </a:tc>
-                <a:tc>
-                  <a:txBody>
-                    <a:bodyPr/>
-                    <a:lstStyle/>
-                    <a:p>
-                      <a:r>
-                        <a:rPr lang="en-GB" sz="1100" dirty="0"/>
-                        <a:t>103.67</a:t>
-                      </a:r>
-                    </a:p>
-                  </a:txBody>
-                  <a:tcPr/>
-                </a:tc>
-                <a:tc>
-                  <a:txBody>
-                    <a:bodyPr/>
-                    <a:lstStyle/>
-                    <a:p>
-                      <a:r>
-                        <a:rPr lang="en-GB" sz="1100" dirty="0"/>
-                        <a:t>291.05</a:t>
-                      </a:r>
-                    </a:p>
-                  </a:txBody>
-                  <a:tcPr/>
-                </a:tc>
-                <a:tc>
-                  <a:txBody>
-                    <a:bodyPr/>
-                    <a:lstStyle/>
-                    <a:p>
-                      <a:r>
-                        <a:rPr lang="en-GB" sz="1100" dirty="0"/>
-                        <a:t>42.28</a:t>
-                      </a:r>
-                    </a:p>
-                  </a:txBody>
-                  <a:tcPr/>
-                </a:tc>
-                <a:extLst>
-                  <a:ext uri="{0D108BD9-81ED-4DB2-BD59-A6C34878D82A}">
-                    <a16:rowId xmlns:a16="http://schemas.microsoft.com/office/drawing/2014/main" val="2468859034"/>
-                  </a:ext>
-                </a:extLst>
-              </a:tr>
-              <a:tr h="200633">
-                <a:tc>
-                  <a:txBody>
-                    <a:bodyPr/>
-                    <a:lstStyle/>
-                    <a:p>
-                      <a:r>
-                        <a:rPr lang="en-GB" sz="1100" dirty="0"/>
-                        <a:t>BMI</a:t>
-                      </a:r>
-                    </a:p>
-                  </a:txBody>
-                  <a:tcPr/>
-                </a:tc>
-                <a:tc>
-                  <a:txBody>
-                    <a:bodyPr/>
-                    <a:lstStyle/>
-                    <a:p>
-                      <a:r>
-                        <a:rPr lang="en-GB" sz="1100" dirty="0"/>
-                        <a:t>10.10</a:t>
-                      </a:r>
-                    </a:p>
-                  </a:txBody>
-                  <a:tcPr/>
-                </a:tc>
-                <a:tc>
-                  <a:txBody>
-                    <a:bodyPr/>
-                    <a:lstStyle/>
-                    <a:p>
-                      <a:r>
-                        <a:rPr lang="en-GB" sz="1100" dirty="0"/>
-                        <a:t>28.62</a:t>
-                      </a:r>
-                    </a:p>
-                  </a:txBody>
-                  <a:tcPr/>
-                </a:tc>
-                <a:tc>
-                  <a:txBody>
-                    <a:bodyPr/>
-                    <a:lstStyle/>
-                    <a:p>
-                      <a:r>
-                        <a:rPr lang="en-GB" sz="1100" dirty="0"/>
-                        <a:t>97.60</a:t>
-                      </a:r>
-                    </a:p>
-                  </a:txBody>
-                  <a:tcPr/>
-                </a:tc>
-                <a:tc>
-                  <a:txBody>
-                    <a:bodyPr/>
-                    <a:lstStyle/>
-                    <a:p>
-                      <a:r>
-                        <a:rPr lang="en-GB" sz="1100" dirty="0"/>
-                        <a:t>7.77</a:t>
-                      </a:r>
-                    </a:p>
-                  </a:txBody>
-                  <a:tcPr/>
-                </a:tc>
-                <a:extLst>
-                  <a:ext uri="{0D108BD9-81ED-4DB2-BD59-A6C34878D82A}">
-                    <a16:rowId xmlns:a16="http://schemas.microsoft.com/office/drawing/2014/main" val="520551929"/>
-                  </a:ext>
-                </a:extLst>
-              </a:tr>
-            </a:tbl>
-          </a:graphicData>
-        </a:graphic>
-      </p:graphicFrame>
       <p:pic>
         <p:nvPicPr>
           <p:cNvPr id="33" name="Picture 32" descr="Chart, bar chart&#10;&#10;Description automatically generated">
@@ -4325,7 +3514,7 @@
           <p:nvPr/>
         </p:nvPicPr>
         <p:blipFill>
-          <a:blip r:embed="rId3">
+          <a:blip r:embed="rId4">
             <a:extLst>
               <a:ext uri="{28A0092B-C50C-407E-A947-70E740481C1C}">
                 <a14:useLocalDpi xmlns:a14="http://schemas.microsoft.com/office/drawing/2010/main" val="0"/>
@@ -4338,102 +3527,14 @@
         </p:blipFill>
         <p:spPr>
           <a:xfrm>
-            <a:off x="487600" y="6521300"/>
-            <a:ext cx="3622134" cy="1811067"/>
+            <a:off x="7099300" y="6628217"/>
+            <a:ext cx="3574597" cy="1787299"/>
           </a:xfrm>
           <a:prstGeom prst="rect">
             <a:avLst/>
           </a:prstGeom>
         </p:spPr>
       </p:pic>
-      <p:pic>
-        <p:nvPicPr>
-          <p:cNvPr id="37" name="Picture 36" descr="Chart, histogram&#10;&#10;Description automatically generated">
-            <a:extLst>
-              <a:ext uri="{FF2B5EF4-FFF2-40B4-BE49-F238E27FC236}">
-                <a16:creationId xmlns:a16="http://schemas.microsoft.com/office/drawing/2014/main" id="{C8D46654-1AE0-4027-996E-C099BE4ED8EF}"/>
-              </a:ext>
-            </a:extLst>
-          </p:cNvPr>
-          <p:cNvPicPr>
-            <a:picLocks noChangeAspect="1"/>
-          </p:cNvPicPr>
-          <p:nvPr/>
-        </p:nvPicPr>
-        <p:blipFill rotWithShape="1">
-          <a:blip r:embed="rId4">
-            <a:extLst>
-              <a:ext uri="{28A0092B-C50C-407E-A947-70E740481C1C}">
-                <a14:useLocalDpi xmlns:a14="http://schemas.microsoft.com/office/drawing/2010/main" val="0"/>
-              </a:ext>
-            </a:extLst>
-          </a:blip>
-          <a:srcRect b="6057"/>
-          <a:stretch/>
-        </p:blipFill>
-        <p:spPr>
-          <a:xfrm>
-            <a:off x="7333801" y="6314597"/>
-            <a:ext cx="6170295" cy="1932175"/>
-          </a:xfrm>
-          <a:prstGeom prst="rect">
-            <a:avLst/>
-          </a:prstGeom>
-        </p:spPr>
-      </p:pic>
-      <p:sp>
-        <p:nvSpPr>
-          <p:cNvPr id="2" name="TextBox 1">
-            <a:extLst>
-              <a:ext uri="{FF2B5EF4-FFF2-40B4-BE49-F238E27FC236}">
-                <a16:creationId xmlns:a16="http://schemas.microsoft.com/office/drawing/2014/main" id="{95994439-8212-4AB4-A0C0-8AADC5095FD6}"/>
-              </a:ext>
-            </a:extLst>
-          </p:cNvPr>
-          <p:cNvSpPr txBox="1"/>
-          <p:nvPr/>
-        </p:nvSpPr>
-        <p:spPr>
-          <a:xfrm>
-            <a:off x="11315700" y="2447249"/>
-            <a:ext cx="3290788" cy="276999"/>
-          </a:xfrm>
-          <a:prstGeom prst="rect">
-            <a:avLst/>
-          </a:prstGeom>
-          <a:noFill/>
-        </p:spPr>
-        <p:txBody>
-          <a:bodyPr wrap="square" rtlCol="0">
-            <a:spAutoFit/>
-          </a:bodyPr>
-          <a:lstStyle/>
-          <a:p>
-            <a:pPr algn="ctr"/>
-            <a:r>
-              <a:rPr lang="de-DE" sz="1200" dirty="0"/>
-              <a:t>Summary </a:t>
-            </a:r>
-            <a:r>
-              <a:rPr lang="de-DE" sz="1200" dirty="0" err="1"/>
-              <a:t>Statistics</a:t>
-            </a:r>
-            <a:r>
-              <a:rPr lang="de-DE" sz="1200" dirty="0"/>
-              <a:t> – </a:t>
-            </a:r>
-            <a:r>
-              <a:rPr lang="de-DE" sz="1200" dirty="0" err="1"/>
-              <a:t>Numeric</a:t>
-            </a:r>
-            <a:r>
-              <a:rPr lang="de-DE" sz="1200" dirty="0"/>
-              <a:t> Variables</a:t>
-            </a:r>
-            <a:endParaRPr lang="en-GB" sz="1200" dirty="0"/>
-          </a:p>
-        </p:txBody>
-      </p:sp>
       <p:pic>
         <p:nvPicPr>
           <p:cNvPr id="5" name="Picture 4" descr="Chart, diagram&#10;&#10;Description automatically generated with medium confidence">
@@ -4461,7 +3562,7 @@
         </p:blipFill>
         <p:spPr>
           <a:xfrm>
-            <a:off x="4652604" y="6575652"/>
+            <a:off x="313967" y="6676061"/>
             <a:ext cx="2214272" cy="1756715"/>
           </a:xfrm>
           <a:prstGeom prst="rect">
@@ -5375,8 +4476,8 @@
         </p:blipFill>
         <p:spPr>
           <a:xfrm>
-            <a:off x="15776574" y="6614671"/>
-            <a:ext cx="4775201" cy="2002839"/>
+            <a:off x="16607085" y="6514813"/>
+            <a:ext cx="4531687" cy="1900703"/>
           </a:xfrm>
           <a:prstGeom prst="rect">
             <a:avLst/>
@@ -5398,14 +4499,14 @@
           <p:nvPr>
             <p:extLst>
               <p:ext uri="{D42A27DB-BD31-4B8C-83A1-F6EECF244321}">
-                <p14:modId xmlns:p14="http://schemas.microsoft.com/office/powerpoint/2010/main" val="207190448"/>
+                <p14:modId xmlns:p14="http://schemas.microsoft.com/office/powerpoint/2010/main" val="2559571477"/>
               </p:ext>
             </p:extLst>
           </p:nvPr>
         </p:nvGraphicFramePr>
         <p:xfrm>
-          <a:off x="13445111" y="5964058"/>
-          <a:ext cx="2077463" cy="2590800"/>
+          <a:off x="2755900" y="6847828"/>
+          <a:ext cx="2077463" cy="1813560"/>
         </p:xfrm>
         <a:graphic>
           <a:graphicData uri="http://schemas.openxmlformats.org/drawingml/2006/table">
@@ -5437,7 +4538,7 @@
                     <a:p>
                       <a:r>
                         <a:rPr lang="en-GB" sz="1100" dirty="0"/>
-                        <a:t>Variable</a:t>
+                        <a:t>Binary Variable</a:t>
                       </a:r>
                     </a:p>
                   </a:txBody>
@@ -5707,7 +4808,144 @@
                 </a:tc>
                 <a:extLst>
                   <a:ext uri="{0D108BD9-81ED-4DB2-BD59-A6C34878D82A}">
-                    <a16:rowId xmlns:a16="http://schemas.microsoft.com/office/drawing/2014/main" val="3461106054"/>
+                    <a16:rowId xmlns:a16="http://schemas.microsoft.com/office/drawing/2014/main" val="1983994684"/>
+                  </a:ext>
+                </a:extLst>
+              </a:tr>
+            </a:tbl>
+          </a:graphicData>
+        </a:graphic>
+      </p:graphicFrame>
+      <p:sp>
+        <p:nvSpPr>
+          <p:cNvPr id="32" name="Rectangle 31">
+            <a:extLst>
+              <a:ext uri="{FF2B5EF4-FFF2-40B4-BE49-F238E27FC236}">
+                <a16:creationId xmlns:a16="http://schemas.microsoft.com/office/drawing/2014/main" id="{28ACA48B-C72B-4F03-B26A-DFEAEEDB7800}"/>
+              </a:ext>
+            </a:extLst>
+          </p:cNvPr>
+          <p:cNvSpPr/>
+          <p:nvPr/>
+        </p:nvSpPr>
+        <p:spPr>
+          <a:xfrm>
+            <a:off x="10728101" y="12931414"/>
+            <a:ext cx="10520363" cy="1932175"/>
+          </a:xfrm>
+          <a:prstGeom prst="rect">
+            <a:avLst/>
+          </a:prstGeom>
+          <a:ln w="38100"/>
+        </p:spPr>
+        <p:style>
+          <a:lnRef idx="2">
+            <a:schemeClr val="dk1"/>
+          </a:lnRef>
+          <a:fillRef idx="1">
+            <a:schemeClr val="lt1"/>
+          </a:fillRef>
+          <a:effectRef idx="0">
+            <a:schemeClr val="dk1"/>
+          </a:effectRef>
+          <a:fontRef idx="minor">
+            <a:schemeClr val="dk1"/>
+          </a:fontRef>
+        </p:style>
+        <p:txBody>
+          <a:bodyPr rtlCol="0" anchor="t"/>
+          <a:lstStyle/>
+          <a:p>
+            <a:r>
+              <a:rPr lang="en-US" sz="2000" b="1" dirty="0"/>
+              <a:t>5) Description of the choice of training and evaluation methodology </a:t>
+            </a:r>
+          </a:p>
+          <a:p>
+            <a:pPr marL="342900" indent="-342900">
+              <a:buFont typeface="Arial" panose="020B0604020202020204" pitchFamily="34" charset="0"/>
+              <a:buChar char="•"/>
+            </a:pPr>
+            <a:endParaRPr lang="en-US" sz="1600" dirty="0"/>
+          </a:p>
+        </p:txBody>
+      </p:sp>
+      <p:graphicFrame>
+        <p:nvGraphicFramePr>
+          <p:cNvPr id="26" name="Table 27">
+            <a:extLst>
+              <a:ext uri="{FF2B5EF4-FFF2-40B4-BE49-F238E27FC236}">
+                <a16:creationId xmlns:a16="http://schemas.microsoft.com/office/drawing/2014/main" id="{F0AFA4EF-3F31-4397-A367-EBB9956F2788}"/>
+              </a:ext>
+            </a:extLst>
+          </p:cNvPr>
+          <p:cNvGraphicFramePr>
+            <a:graphicFrameLocks noGrp="1"/>
+          </p:cNvGraphicFramePr>
+          <p:nvPr>
+            <p:extLst>
+              <p:ext uri="{D42A27DB-BD31-4B8C-83A1-F6EECF244321}">
+                <p14:modId xmlns:p14="http://schemas.microsoft.com/office/powerpoint/2010/main" val="3769130840"/>
+              </p:ext>
+            </p:extLst>
+          </p:nvPr>
+        </p:nvGraphicFramePr>
+        <p:xfrm>
+          <a:off x="4927600" y="6847828"/>
+          <a:ext cx="2077463" cy="1554480"/>
+        </p:xfrm>
+        <a:graphic>
+          <a:graphicData uri="http://schemas.openxmlformats.org/drawingml/2006/table">
+            <a:tbl>
+              <a:tblPr firstRow="1" bandRow="1">
+                <a:tableStyleId>{9D7B26C5-4107-4FEC-AEDC-1716B250A1EF}</a:tableStyleId>
+              </a:tblPr>
+              <a:tblGrid>
+                <a:gridCol w="1041400">
+                  <a:extLst>
+                    <a:ext uri="{9D8B030D-6E8A-4147-A177-3AD203B41FA5}">
+                      <a16:colId xmlns:a16="http://schemas.microsoft.com/office/drawing/2014/main" val="3467800109"/>
+                    </a:ext>
+                  </a:extLst>
+                </a:gridCol>
+                <a:gridCol w="1036063">
+                  <a:extLst>
+                    <a:ext uri="{9D8B030D-6E8A-4147-A177-3AD203B41FA5}">
+                      <a16:colId xmlns:a16="http://schemas.microsoft.com/office/drawing/2014/main" val="2542221043"/>
+                    </a:ext>
+                  </a:extLst>
+                </a:gridCol>
+              </a:tblGrid>
+              <a:tr h="178772">
+                <a:tc>
+                  <a:txBody>
+                    <a:bodyPr/>
+                    <a:lstStyle/>
+                    <a:p>
+                      <a:r>
+                        <a:rPr lang="en-GB" sz="1100" dirty="0"/>
+                        <a:t>Other Variable</a:t>
+                      </a:r>
+                    </a:p>
+                  </a:txBody>
+                  <a:tcPr/>
+                </a:tc>
+                <a:tc>
+                  <a:txBody>
+                    <a:bodyPr/>
+                    <a:lstStyle/>
+                    <a:p>
+                      <a:r>
+                        <a:rPr lang="en-GB" sz="1100" dirty="0"/>
+                        <a:t>Values</a:t>
+                      </a:r>
+                    </a:p>
+                  </a:txBody>
+                  <a:tcPr/>
+                </a:tc>
+                <a:extLst>
+                  <a:ext uri="{0D108BD9-81ED-4DB2-BD59-A6C34878D82A}">
+                    <a16:rowId xmlns:a16="http://schemas.microsoft.com/office/drawing/2014/main" val="1769268115"/>
                   </a:ext>
                 </a:extLst>
               </a:tr>
@@ -5814,64 +5052,70 @@
                   </a:ext>
                 </a:extLst>
               </a:tr>
+              <a:tr h="200633">
+                <a:tc>
+                  <a:txBody>
+                    <a:bodyPr/>
+                    <a:lstStyle/>
+                    <a:p>
+                      <a:r>
+                        <a:rPr lang="en-GB" sz="1100" dirty="0"/>
+                        <a:t>Smoker</a:t>
+                      </a:r>
+                    </a:p>
+                  </a:txBody>
+                  <a:tcPr/>
+                </a:tc>
+                <a:tc>
+                  <a:txBody>
+                    <a:bodyPr/>
+                    <a:lstStyle/>
+                    <a:p>
+                      <a:endParaRPr lang="en-GB" sz="1100" dirty="0"/>
+                    </a:p>
+                  </a:txBody>
+                  <a:tcPr/>
+                </a:tc>
+                <a:extLst>
+                  <a:ext uri="{0D108BD9-81ED-4DB2-BD59-A6C34878D82A}">
+                    <a16:rowId xmlns:a16="http://schemas.microsoft.com/office/drawing/2014/main" val="3364761051"/>
+                  </a:ext>
+                </a:extLst>
+              </a:tr>
+              <a:tr h="200633">
+                <a:tc>
+                  <a:txBody>
+                    <a:bodyPr/>
+                    <a:lstStyle/>
+                    <a:p>
+                      <a:r>
+                        <a:rPr lang="en-GB" sz="1100" dirty="0"/>
+                        <a:t>Work Type</a:t>
+                      </a:r>
+                    </a:p>
+                  </a:txBody>
+                  <a:tcPr/>
+                </a:tc>
+                <a:tc>
+                  <a:txBody>
+                    <a:bodyPr/>
+                    <a:lstStyle/>
+                    <a:p>
+                      <a:endParaRPr lang="en-GB" sz="1100" dirty="0"/>
+                    </a:p>
+                  </a:txBody>
+                  <a:tcPr/>
+                </a:tc>
+                <a:extLst>
+                  <a:ext uri="{0D108BD9-81ED-4DB2-BD59-A6C34878D82A}">
+                    <a16:rowId xmlns:a16="http://schemas.microsoft.com/office/drawing/2014/main" val="2557298025"/>
+                  </a:ext>
+                </a:extLst>
+              </a:tr>
             </a:tbl>
           </a:graphicData>
         </a:graphic>
       </p:graphicFrame>
-      <p:sp>
-        <p:nvSpPr>
-          <p:cNvPr id="32" name="Rectangle 31">
-            <a:extLst>
-              <a:ext uri="{FF2B5EF4-FFF2-40B4-BE49-F238E27FC236}">
-                <a16:creationId xmlns:a16="http://schemas.microsoft.com/office/drawing/2014/main" id="{28ACA48B-C72B-4F03-B26A-DFEAEEDB7800}"/>
-              </a:ext>
-            </a:extLst>
-          </p:cNvPr>
-          <p:cNvSpPr/>
-          <p:nvPr/>
-        </p:nvSpPr>
-        <p:spPr>
-          <a:xfrm>
-            <a:off x="10728101" y="12931414"/>
-            <a:ext cx="10520363" cy="1932175"/>
-          </a:xfrm>
-          <a:prstGeom prst="rect">
-            <a:avLst/>
-          </a:prstGeom>
-          <a:ln w="38100"/>
-        </p:spPr>
-        <p:style>
-          <a:lnRef idx="2">
-            <a:schemeClr val="dk1"/>
-          </a:lnRef>
-          <a:fillRef idx="1">
-            <a:schemeClr val="lt1"/>
-          </a:fillRef>
-          <a:effectRef idx="0">
-            <a:schemeClr val="dk1"/>
-          </a:effectRef>
-          <a:fontRef idx="minor">
-            <a:schemeClr val="dk1"/>
-          </a:fontRef>
-        </p:style>
-        <p:txBody>
-          <a:bodyPr rtlCol="0" anchor="t"/>
-          <a:lstStyle/>
-          <a:p>
-            <a:r>
-              <a:rPr lang="en-US" sz="2000" b="1" dirty="0"/>
-              <a:t>5) Description of the choice of training and evaluation methodology </a:t>
-            </a:r>
-          </a:p>
-          <a:p>
-            <a:pPr marL="342900" indent="-342900">
-              <a:buFont typeface="Arial" panose="020B0604020202020204" pitchFamily="34" charset="0"/>
-              <a:buChar char="•"/>
-            </a:pPr>
-            <a:endParaRPr lang="en-US" sz="1600" dirty="0"/>
-          </a:p>
-        </p:txBody>
-      </p:sp>
     </p:spTree>
     <p:extLst>
       <p:ext uri="{BB962C8B-B14F-4D97-AF65-F5344CB8AC3E}">

</xml_diff>